<commit_message>
fix: final config fixes
</commit_message>
<xml_diff>
--- a/docs/Opzet en bevindingen.pptx
+++ b/docs/Opzet en bevindingen.pptx
@@ -4817,7 +4817,7 @@
           <a:p>
             <a:r>
               <a:rPr lang="nl-NL" dirty="0"/>
-              <a:t>Bevinding 4: </a:t>
+              <a:t>Bevinding 5: </a:t>
             </a:r>
             <a:r>
               <a:rPr lang="nl-NL" dirty="0" err="1"/>
@@ -4886,59 +4886,59 @@
           <a:lstStyle/>
           <a:p>
             <a:r>
-              <a:rPr lang="en-US" sz="2000" dirty="0" err="1"/>
+              <a:rPr lang="en-US" sz="1600" dirty="0" err="1"/>
               <a:t>Paar</a:t>
             </a:r>
             <a:r>
-              <a:rPr lang="en-US" sz="2000" dirty="0"/>
+              <a:rPr lang="en-US" sz="1600" dirty="0"/>
               <a:t> </a:t>
             </a:r>
             <a:r>
-              <a:rPr lang="en-US" sz="2000" dirty="0" err="1"/>
+              <a:rPr lang="en-US" sz="1600" dirty="0" err="1"/>
               <a:t>keer</a:t>
             </a:r>
             <a:r>
-              <a:rPr lang="en-US" sz="2000" dirty="0"/>
+              <a:rPr lang="en-US" sz="1600" dirty="0"/>
               <a:t> </a:t>
             </a:r>
             <a:r>
-              <a:rPr lang="en-US" sz="2000" dirty="0" err="1"/>
+              <a:rPr lang="en-US" sz="1600" dirty="0" err="1"/>
               <a:t>moeilijkheden</a:t>
             </a:r>
             <a:r>
-              <a:rPr lang="en-US" sz="2000" dirty="0"/>
+              <a:rPr lang="en-US" sz="1600" dirty="0"/>
               <a:t> met / op </a:t>
             </a:r>
             <a:r>
-              <a:rPr lang="en-US" sz="2000" dirty="0" err="1"/>
+              <a:rPr lang="en-US" sz="1600" dirty="0" err="1"/>
               <a:t>einde</a:t>
             </a:r>
             <a:r>
-              <a:rPr lang="en-US" sz="2000" dirty="0"/>
+              <a:rPr lang="en-US" sz="1600" dirty="0"/>
               <a:t> van </a:t>
             </a:r>
             <a:r>
-              <a:rPr lang="en-US" sz="2000" dirty="0" err="1"/>
+              <a:rPr lang="en-US" sz="1600" dirty="0" err="1"/>
               <a:t>paden</a:t>
             </a:r>
             <a:r>
-              <a:rPr lang="en-US" sz="2000" dirty="0"/>
+              <a:rPr lang="en-US" sz="1600" dirty="0"/>
               <a:t> (</a:t>
             </a:r>
             <a:r>
-              <a:rPr lang="en-US" sz="2000" dirty="0" err="1"/>
+              <a:rPr lang="en-US" sz="1600" dirty="0" err="1"/>
               <a:t>wel</a:t>
             </a:r>
             <a:r>
-              <a:rPr lang="en-US" sz="2000" dirty="0"/>
+              <a:rPr lang="en-US" sz="1600" dirty="0"/>
               <a:t>/</a:t>
             </a:r>
             <a:r>
-              <a:rPr lang="en-US" sz="2000" dirty="0" err="1"/>
+              <a:rPr lang="en-US" sz="1600" dirty="0" err="1"/>
               <a:t>niet</a:t>
             </a:r>
             <a:r>
-              <a:rPr lang="en-US" sz="2000" dirty="0"/>
+              <a:rPr lang="en-US" sz="1600" dirty="0"/>
               <a:t>)</a:t>
             </a:r>
           </a:p>
@@ -4947,16 +4947,173 @@
               <a:rPr lang="en-GB" dirty="0"/>
               <a:t>BMV_ELASTICSEARCH_URL is hostname + port</a:t>
             </a:r>
-            <a:endParaRPr lang="en-US" sz="2000" dirty="0"/>
-          </a:p>
-          <a:p>
-            <a:endParaRPr lang="en-GB" dirty="0"/>
+          </a:p>
+          <a:p>
+            <a:r>
+              <a:rPr lang="en-GB" sz="1600" dirty="0"/>
+              <a:t>Containers </a:t>
+            </a:r>
+            <a:r>
+              <a:rPr lang="en-GB" sz="1600" dirty="0" err="1"/>
+              <a:t>kosten</a:t>
+            </a:r>
+            <a:r>
+              <a:rPr lang="en-GB" sz="1600" dirty="0"/>
+              <a:t> geld, hoe minder containers hoe </a:t>
+            </a:r>
+            <a:r>
+              <a:rPr lang="en-GB" sz="1600" dirty="0" err="1"/>
+              <a:t>goedkoper</a:t>
+            </a:r>
+            <a:endParaRPr lang="en-GB" sz="1600" dirty="0"/>
+          </a:p>
+          <a:p>
+            <a:pPr lvl="1"/>
+            <a:r>
+              <a:rPr lang="en-US" sz="1400" dirty="0" err="1"/>
+              <a:t>Deze</a:t>
+            </a:r>
+            <a:r>
+              <a:rPr lang="en-US" sz="1400" dirty="0"/>
+              <a:t> </a:t>
+            </a:r>
+            <a:r>
+              <a:rPr lang="en-US" sz="1400" dirty="0" err="1"/>
+              <a:t>kosten</a:t>
+            </a:r>
+            <a:r>
+              <a:rPr lang="en-US" sz="1400" dirty="0"/>
+              <a:t> </a:t>
+            </a:r>
+            <a:r>
+              <a:rPr lang="en-US" sz="1400" dirty="0" err="1"/>
+              <a:t>zijn</a:t>
+            </a:r>
+            <a:r>
+              <a:rPr lang="en-US" sz="1400" dirty="0"/>
+              <a:t> </a:t>
+            </a:r>
+            <a:r>
+              <a:rPr lang="en-US" sz="1400" dirty="0" err="1"/>
+              <a:t>zonder</a:t>
+            </a:r>
+            <a:r>
+              <a:rPr lang="en-US" sz="1400" dirty="0"/>
+              <a:t> </a:t>
+            </a:r>
+            <a:r>
+              <a:rPr lang="en-US" sz="1400" dirty="0" err="1"/>
+              <a:t>nodige</a:t>
+            </a:r>
+            <a:r>
+              <a:rPr lang="en-US" sz="1400" dirty="0"/>
+              <a:t> extras </a:t>
+            </a:r>
+            <a:r>
+              <a:rPr lang="en-US" sz="1400" dirty="0" err="1"/>
+              <a:t>als</a:t>
+            </a:r>
+            <a:r>
+              <a:rPr lang="en-US" sz="1400" dirty="0"/>
+              <a:t> WAF, CloudWatch, DevOps guru </a:t>
+            </a:r>
+            <a:r>
+              <a:rPr lang="en-US" sz="1400" dirty="0" err="1"/>
+              <a:t>voor</a:t>
+            </a:r>
+            <a:r>
+              <a:rPr lang="en-US" sz="1400" dirty="0"/>
+              <a:t> monitoring</a:t>
+            </a:r>
+          </a:p>
+          <a:p>
+            <a:pPr lvl="1"/>
+            <a:r>
+              <a:rPr lang="en-US" sz="1400" dirty="0"/>
+              <a:t>50% van de containers </a:t>
+            </a:r>
+            <a:r>
+              <a:rPr lang="en-US" sz="1400" dirty="0" err="1"/>
+              <a:t>draait</a:t>
+            </a:r>
+            <a:r>
+              <a:rPr lang="en-US" sz="1400" dirty="0"/>
+              <a:t> </a:t>
+            </a:r>
+            <a:r>
+              <a:rPr lang="en-US" sz="1400" dirty="0" err="1"/>
+              <a:t>als</a:t>
+            </a:r>
+            <a:r>
+              <a:rPr lang="en-US" sz="1400" dirty="0"/>
+              <a:t> spot instance (</a:t>
+            </a:r>
+            <a:r>
+              <a:rPr lang="en-US" sz="1400" dirty="0" err="1"/>
+              <a:t>goedkoper</a:t>
+            </a:r>
+            <a:r>
+              <a:rPr lang="en-US" sz="1400" dirty="0"/>
+              <a:t>, maar </a:t>
+            </a:r>
+            <a:r>
+              <a:rPr lang="en-US" sz="1400" dirty="0" err="1"/>
+              <a:t>kan</a:t>
+            </a:r>
+            <a:r>
+              <a:rPr lang="en-US" sz="1400" dirty="0"/>
+              <a:t> </a:t>
+            </a:r>
+            <a:r>
+              <a:rPr lang="en-US" sz="1400" dirty="0" err="1"/>
+              <a:t>zomaar</a:t>
+            </a:r>
+            <a:r>
+              <a:rPr lang="en-US" sz="1400" dirty="0"/>
+              <a:t> </a:t>
+            </a:r>
+            <a:r>
+              <a:rPr lang="en-US" sz="1400" dirty="0" err="1"/>
+              <a:t>gestopt</a:t>
+            </a:r>
+            <a:r>
+              <a:rPr lang="en-US" sz="1400" dirty="0"/>
+              <a:t> </a:t>
+            </a:r>
+            <a:r>
+              <a:rPr lang="en-US" sz="1400" dirty="0" err="1"/>
+              <a:t>en</a:t>
+            </a:r>
+            <a:r>
+              <a:rPr lang="en-US" sz="1400" dirty="0"/>
+              <a:t> </a:t>
+            </a:r>
+            <a:r>
+              <a:rPr lang="en-US" sz="1400" dirty="0" err="1"/>
+              <a:t>verplaatst</a:t>
+            </a:r>
+            <a:r>
+              <a:rPr lang="en-US" sz="1400" dirty="0"/>
+              <a:t> </a:t>
+            </a:r>
+            <a:r>
+              <a:rPr lang="en-US" sz="1400" dirty="0" err="1"/>
+              <a:t>worden</a:t>
+            </a:r>
+            <a:r>
+              <a:rPr lang="en-US" sz="1400" dirty="0"/>
+              <a:t>)</a:t>
+            </a:r>
+            <a:endParaRPr lang="en-US" sz="1800" dirty="0"/>
+          </a:p>
+          <a:p>
+            <a:endParaRPr lang="en-GB" sz="1400" dirty="0"/>
           </a:p>
           <a:p>
             <a:pPr marL="0" indent="0">
               <a:buNone/>
             </a:pPr>
-            <a:endParaRPr lang="en-GB" sz="2400" b="0" dirty="0">
+            <a:endParaRPr lang="en-GB" sz="2000" b="0" dirty="0">
               <a:solidFill>
                 <a:srgbClr val="D4D4D4"/>
               </a:solidFill>
@@ -5013,11 +5170,41 @@
           <a:p>
             <a:r>
               <a:rPr lang="nl-NL" dirty="0"/>
-              <a:t>Bevinding 4: Algemeen</a:t>
-            </a:r>
-          </a:p>
-        </p:txBody>
-      </p:sp>
+              <a:t>Bevinding 6: Algemeen</a:t>
+            </a:r>
+          </a:p>
+        </p:txBody>
+      </p:sp>
+      <p:pic>
+        <p:nvPicPr>
+          <p:cNvPr id="2" name="Picture 1">
+            <a:extLst>
+              <a:ext uri="{FF2B5EF4-FFF2-40B4-BE49-F238E27FC236}">
+                <a16:creationId xmlns:a16="http://schemas.microsoft.com/office/drawing/2014/main" id="{43E65420-12A1-F8BF-9E52-8F104DB618A2}"/>
+              </a:ext>
+            </a:extLst>
+          </p:cNvPr>
+          <p:cNvPicPr>
+            <a:picLocks noChangeAspect="1"/>
+          </p:cNvPicPr>
+          <p:nvPr/>
+        </p:nvPicPr>
+        <p:blipFill>
+          <a:blip r:embed="rId2"/>
+          <a:stretch>
+            <a:fillRect/>
+          </a:stretch>
+        </p:blipFill>
+        <p:spPr>
+          <a:xfrm>
+            <a:off x="752560" y="3303752"/>
+            <a:ext cx="5343440" cy="2956922"/>
+          </a:xfrm>
+          <a:prstGeom prst="rect">
+            <a:avLst/>
+          </a:prstGeom>
+        </p:spPr>
+      </p:pic>
     </p:spTree>
     <p:extLst>
       <p:ext uri="{BB962C8B-B14F-4D97-AF65-F5344CB8AC3E}">
@@ -7243,7 +7430,7 @@
         </p:nvSpPr>
         <p:spPr>
           <a:xfrm>
-            <a:off x="839492" y="1794130"/>
+            <a:off x="838200" y="1816201"/>
             <a:ext cx="9823708" cy="4352400"/>
           </a:xfrm>
         </p:spPr>

</xml_diff>